<commit_message>
adding map with 0 on it
</commit_message>
<xml_diff>
--- a/map/8map.pptx
+++ b/map/8map.pptx
@@ -6,6 +6,7 @@
   </p:sldMasterIdLst>
   <p:sldIdLst>
     <p:sldId id="256" r:id="rId2"/>
+    <p:sldId id="257" r:id="rId3"/>
   </p:sldIdLst>
   <p:sldSz cx="12192000" cy="6858000"/>
   <p:notesSz cx="6858000" cy="9144000"/>
@@ -5407,6 +5408,1665 @@
 </p:sld>
 </file>
 
+<file path=ppt/slides/slide2.xml><?xml version="1.0" encoding="utf-8"?>
+<p:sld xmlns:a="http://schemas.openxmlformats.org/drawingml/2006/main" xmlns:r="http://schemas.openxmlformats.org/officeDocument/2006/relationships" xmlns:p="http://schemas.openxmlformats.org/presentationml/2006/main">
+  <p:cSld>
+    <p:spTree>
+      <p:nvGrpSpPr>
+        <p:cNvPr id="1" name=""/>
+        <p:cNvGrpSpPr/>
+        <p:nvPr/>
+      </p:nvGrpSpPr>
+      <p:grpSpPr>
+        <a:xfrm>
+          <a:off x="0" y="0"/>
+          <a:ext cx="0" cy="0"/>
+          <a:chOff x="0" y="0"/>
+          <a:chExt cx="0" cy="0"/>
+        </a:xfrm>
+      </p:grpSpPr>
+      <p:sp>
+        <p:nvSpPr>
+          <p:cNvPr id="4" name="Rectangle 3">
+            <a:extLst>
+              <a:ext uri="{FF2B5EF4-FFF2-40B4-BE49-F238E27FC236}">
+                <a16:creationId xmlns:a16="http://schemas.microsoft.com/office/drawing/2014/main" id="{58F227DE-1AC6-4624-859E-7C22557FB09D}"/>
+              </a:ext>
+            </a:extLst>
+          </p:cNvPr>
+          <p:cNvSpPr/>
+          <p:nvPr/>
+        </p:nvSpPr>
+        <p:spPr>
+          <a:xfrm>
+            <a:off x="4206397" y="3484970"/>
+            <a:ext cx="1946753" cy="2685382"/>
+          </a:xfrm>
+          <a:prstGeom prst="rect">
+            <a:avLst/>
+          </a:prstGeom>
+        </p:spPr>
+        <p:style>
+          <a:lnRef idx="2">
+            <a:schemeClr val="dk1">
+              <a:shade val="50000"/>
+            </a:schemeClr>
+          </a:lnRef>
+          <a:fillRef idx="1">
+            <a:schemeClr val="dk1"/>
+          </a:fillRef>
+          <a:effectRef idx="0">
+            <a:schemeClr val="dk1"/>
+          </a:effectRef>
+          <a:fontRef idx="minor">
+            <a:schemeClr val="lt1"/>
+          </a:fontRef>
+        </p:style>
+        <p:txBody>
+          <a:bodyPr rtlCol="0" anchor="ctr"/>
+          <a:lstStyle/>
+          <a:p>
+            <a:pPr algn="ctr"/>
+            <a:endParaRPr lang="en-US"/>
+          </a:p>
+        </p:txBody>
+      </p:sp>
+      <p:sp>
+        <p:nvSpPr>
+          <p:cNvPr id="5" name="Rectangle: Rounded Corners 4">
+            <a:extLst>
+              <a:ext uri="{FF2B5EF4-FFF2-40B4-BE49-F238E27FC236}">
+                <a16:creationId xmlns:a16="http://schemas.microsoft.com/office/drawing/2014/main" id="{286B0577-D395-41B1-9BE3-61C262C1EA94}"/>
+              </a:ext>
+            </a:extLst>
+          </p:cNvPr>
+          <p:cNvSpPr/>
+          <p:nvPr/>
+        </p:nvSpPr>
+        <p:spPr>
+          <a:xfrm>
+            <a:off x="4324351" y="3543300"/>
+            <a:ext cx="1648408" cy="2514599"/>
+          </a:xfrm>
+          <a:prstGeom prst="roundRect">
+            <a:avLst>
+              <a:gd name="adj" fmla="val 33555"/>
+            </a:avLst>
+          </a:prstGeom>
+          <a:ln w="76200">
+            <a:solidFill>
+              <a:schemeClr val="bg1"/>
+            </a:solidFill>
+          </a:ln>
+        </p:spPr>
+        <p:style>
+          <a:lnRef idx="2">
+            <a:schemeClr val="dk1">
+              <a:shade val="50000"/>
+            </a:schemeClr>
+          </a:lnRef>
+          <a:fillRef idx="1">
+            <a:schemeClr val="dk1"/>
+          </a:fillRef>
+          <a:effectRef idx="0">
+            <a:schemeClr val="dk1"/>
+          </a:effectRef>
+          <a:fontRef idx="minor">
+            <a:schemeClr val="lt1"/>
+          </a:fontRef>
+        </p:style>
+        <p:txBody>
+          <a:bodyPr rtlCol="0" anchor="ctr"/>
+          <a:lstStyle/>
+          <a:p>
+            <a:pPr algn="ctr"/>
+            <a:endParaRPr lang="en-US" dirty="0"/>
+          </a:p>
+        </p:txBody>
+      </p:sp>
+      <p:sp>
+        <p:nvSpPr>
+          <p:cNvPr id="6" name="Rectangle: Top Corners Rounded 5">
+            <a:extLst>
+              <a:ext uri="{FF2B5EF4-FFF2-40B4-BE49-F238E27FC236}">
+                <a16:creationId xmlns:a16="http://schemas.microsoft.com/office/drawing/2014/main" id="{175052CB-EC24-4B95-8826-4145F52194E4}"/>
+              </a:ext>
+            </a:extLst>
+          </p:cNvPr>
+          <p:cNvSpPr/>
+          <p:nvPr/>
+        </p:nvSpPr>
+        <p:spPr>
+          <a:xfrm>
+            <a:off x="5133387" y="4263756"/>
+            <a:ext cx="114298" cy="73958"/>
+          </a:xfrm>
+          <a:prstGeom prst="round2SameRect">
+            <a:avLst/>
+          </a:prstGeom>
+          <a:solidFill>
+            <a:schemeClr val="bg1"/>
+          </a:solidFill>
+          <a:ln w="76200">
+            <a:solidFill>
+              <a:schemeClr val="bg1"/>
+            </a:solidFill>
+          </a:ln>
+        </p:spPr>
+        <p:style>
+          <a:lnRef idx="2">
+            <a:schemeClr val="accent1">
+              <a:shade val="50000"/>
+            </a:schemeClr>
+          </a:lnRef>
+          <a:fillRef idx="1">
+            <a:schemeClr val="accent1"/>
+          </a:fillRef>
+          <a:effectRef idx="0">
+            <a:schemeClr val="accent1"/>
+          </a:effectRef>
+          <a:fontRef idx="minor">
+            <a:schemeClr val="lt1"/>
+          </a:fontRef>
+        </p:style>
+        <p:txBody>
+          <a:bodyPr rtlCol="0" anchor="ctr"/>
+          <a:lstStyle/>
+          <a:p>
+            <a:pPr algn="ctr"/>
+            <a:endParaRPr lang="en-US" dirty="0"/>
+          </a:p>
+        </p:txBody>
+      </p:sp>
+      <p:sp>
+        <p:nvSpPr>
+          <p:cNvPr id="7" name="Rectangle: Top Corners Rounded 6">
+            <a:extLst>
+              <a:ext uri="{FF2B5EF4-FFF2-40B4-BE49-F238E27FC236}">
+                <a16:creationId xmlns:a16="http://schemas.microsoft.com/office/drawing/2014/main" id="{5E064036-839C-426E-AA9B-FA64015093BE}"/>
+              </a:ext>
+            </a:extLst>
+          </p:cNvPr>
+          <p:cNvSpPr/>
+          <p:nvPr/>
+        </p:nvSpPr>
+        <p:spPr>
+          <a:xfrm rot="10800000">
+            <a:off x="5133388" y="4342808"/>
+            <a:ext cx="114298" cy="992701"/>
+          </a:xfrm>
+          <a:prstGeom prst="round2SameRect">
+            <a:avLst/>
+          </a:prstGeom>
+          <a:solidFill>
+            <a:schemeClr val="bg1"/>
+          </a:solidFill>
+          <a:ln w="76200">
+            <a:solidFill>
+              <a:schemeClr val="bg1"/>
+            </a:solidFill>
+          </a:ln>
+        </p:spPr>
+        <p:style>
+          <a:lnRef idx="2">
+            <a:schemeClr val="accent1">
+              <a:shade val="50000"/>
+            </a:schemeClr>
+          </a:lnRef>
+          <a:fillRef idx="1">
+            <a:schemeClr val="accent1"/>
+          </a:fillRef>
+          <a:effectRef idx="0">
+            <a:schemeClr val="accent1"/>
+          </a:effectRef>
+          <a:fontRef idx="minor">
+            <a:schemeClr val="lt1"/>
+          </a:fontRef>
+        </p:style>
+        <p:txBody>
+          <a:bodyPr rtlCol="0" anchor="ctr"/>
+          <a:lstStyle/>
+          <a:p>
+            <a:pPr algn="ctr"/>
+            <a:endParaRPr lang="en-US"/>
+          </a:p>
+        </p:txBody>
+      </p:sp>
+      <p:grpSp>
+        <p:nvGrpSpPr>
+          <p:cNvPr id="44" name="Group 43">
+            <a:extLst>
+              <a:ext uri="{FF2B5EF4-FFF2-40B4-BE49-F238E27FC236}">
+                <a16:creationId xmlns:a16="http://schemas.microsoft.com/office/drawing/2014/main" id="{AB131C43-B5A8-44F7-80AC-62AC0135802E}"/>
+              </a:ext>
+            </a:extLst>
+          </p:cNvPr>
+          <p:cNvGrpSpPr/>
+          <p:nvPr/>
+        </p:nvGrpSpPr>
+        <p:grpSpPr>
+          <a:xfrm>
+            <a:off x="4724400" y="3874735"/>
+            <a:ext cx="914396" cy="962974"/>
+            <a:chOff x="4746961" y="2247286"/>
+            <a:chExt cx="852484" cy="2991575"/>
+          </a:xfrm>
+        </p:grpSpPr>
+        <p:sp>
+          <p:nvSpPr>
+            <p:cNvPr id="21" name="Arc 20">
+              <a:extLst>
+                <a:ext uri="{FF2B5EF4-FFF2-40B4-BE49-F238E27FC236}">
+                  <a16:creationId xmlns:a16="http://schemas.microsoft.com/office/drawing/2014/main" id="{2C497EE2-5D94-4014-9351-53D87CDE79A6}"/>
+                </a:ext>
+              </a:extLst>
+            </p:cNvPr>
+            <p:cNvSpPr/>
+            <p:nvPr/>
+          </p:nvSpPr>
+          <p:spPr>
+            <a:xfrm rot="16200000">
+              <a:off x="3701795" y="3297371"/>
+              <a:ext cx="2837009" cy="739220"/>
+            </a:xfrm>
+            <a:prstGeom prst="arc">
+              <a:avLst>
+                <a:gd name="adj1" fmla="val 16550694"/>
+                <a:gd name="adj2" fmla="val 143163"/>
+              </a:avLst>
+            </a:prstGeom>
+            <a:ln w="38100">
+              <a:solidFill>
+                <a:srgbClr val="FFFF00"/>
+              </a:solidFill>
+              <a:prstDash val="sysDash"/>
+              <a:miter lim="800000"/>
+              <a:extLst>
+                <a:ext uri="{C807C97D-BFC1-408E-A445-0C87EB9F89A2}">
+                  <ask:lineSketchStyleProps xmlns:ask="http://schemas.microsoft.com/office/drawing/2018/sketchyshapes" sd="1219033472">
+                    <a:custGeom>
+                      <a:avLst/>
+                      <a:gdLst>
+                        <a:gd name="connsiteX0" fmla="*/ 395454 w 795337"/>
+                        <a:gd name="connsiteY0" fmla="*/ 6 h 739220"/>
+                        <a:gd name="connsiteX1" fmla="*/ 673541 w 795337"/>
+                        <a:gd name="connsiteY1" fmla="*/ 103402 h 739220"/>
+                        <a:gd name="connsiteX2" fmla="*/ 794938 w 795337"/>
+                        <a:gd name="connsiteY2" fmla="*/ 386164 h 739220"/>
+                        <a:gd name="connsiteX3" fmla="*/ 397669 w 795337"/>
+                        <a:gd name="connsiteY3" fmla="*/ 369610 h 739220"/>
+                        <a:gd name="connsiteX4" fmla="*/ 395454 w 795337"/>
+                        <a:gd name="connsiteY4" fmla="*/ 6 h 739220"/>
+                        <a:gd name="connsiteX0" fmla="*/ 395454 w 795337"/>
+                        <a:gd name="connsiteY0" fmla="*/ 6 h 739220"/>
+                        <a:gd name="connsiteX1" fmla="*/ 673541 w 795337"/>
+                        <a:gd name="connsiteY1" fmla="*/ 103402 h 739220"/>
+                        <a:gd name="connsiteX2" fmla="*/ 794938 w 795337"/>
+                        <a:gd name="connsiteY2" fmla="*/ 386164 h 739220"/>
+                      </a:gdLst>
+                      <a:ahLst/>
+                      <a:cxnLst>
+                        <a:cxn ang="0">
+                          <a:pos x="connsiteX0" y="connsiteY0"/>
+                        </a:cxn>
+                        <a:cxn ang="0">
+                          <a:pos x="connsiteX1" y="connsiteY1"/>
+                        </a:cxn>
+                        <a:cxn ang="0">
+                          <a:pos x="connsiteX2" y="connsiteY2"/>
+                        </a:cxn>
+                      </a:cxnLst>
+                      <a:rect l="l" t="t" r="r" b="b"/>
+                      <a:pathLst>
+                        <a:path w="795337" h="739220" stroke="0" extrusionOk="0">
+                          <a:moveTo>
+                            <a:pt x="395454" y="6"/>
+                          </a:moveTo>
+                          <a:cubicBezTo>
+                            <a:pt x="489062" y="-6725"/>
+                            <a:pt x="590577" y="39688"/>
+                            <a:pt x="673541" y="103402"/>
+                          </a:cubicBezTo>
+                          <a:cubicBezTo>
+                            <a:pt x="764753" y="178949"/>
+                            <a:pt x="793056" y="280301"/>
+                            <a:pt x="794938" y="386164"/>
+                          </a:cubicBezTo>
+                          <a:cubicBezTo>
+                            <a:pt x="713392" y="380894"/>
+                            <a:pt x="484140" y="358154"/>
+                            <a:pt x="397669" y="369610"/>
+                          </a:cubicBezTo>
+                          <a:cubicBezTo>
+                            <a:pt x="388440" y="241763"/>
+                            <a:pt x="405215" y="127518"/>
+                            <a:pt x="395454" y="6"/>
+                          </a:cubicBezTo>
+                          <a:close/>
+                        </a:path>
+                        <a:path w="795337" h="739220" fill="none" extrusionOk="0">
+                          <a:moveTo>
+                            <a:pt x="395454" y="6"/>
+                          </a:moveTo>
+                          <a:cubicBezTo>
+                            <a:pt x="514170" y="1257"/>
+                            <a:pt x="602836" y="28439"/>
+                            <a:pt x="673541" y="103402"/>
+                          </a:cubicBezTo>
+                          <a:cubicBezTo>
+                            <a:pt x="738194" y="174370"/>
+                            <a:pt x="790767" y="288823"/>
+                            <a:pt x="794938" y="386164"/>
+                          </a:cubicBezTo>
+                        </a:path>
+                      </a:pathLst>
+                    </a:custGeom>
+                    <ask:type>
+                      <ask:lineSketchNone/>
+                    </ask:type>
+                  </ask:lineSketchStyleProps>
+                </a:ext>
+              </a:extLst>
+            </a:ln>
+          </p:spPr>
+          <p:style>
+            <a:lnRef idx="1">
+              <a:schemeClr val="accent4"/>
+            </a:lnRef>
+            <a:fillRef idx="0">
+              <a:schemeClr val="accent4"/>
+            </a:fillRef>
+            <a:effectRef idx="0">
+              <a:schemeClr val="accent4"/>
+            </a:effectRef>
+            <a:fontRef idx="minor">
+              <a:schemeClr val="tx1"/>
+            </a:fontRef>
+          </p:style>
+          <p:txBody>
+            <a:bodyPr rtlCol="0" anchor="ctr"/>
+            <a:lstStyle/>
+            <a:p>
+              <a:pPr algn="ctr"/>
+              <a:endParaRPr lang="en-US"/>
+            </a:p>
+          </p:txBody>
+        </p:sp>
+        <p:sp>
+          <p:nvSpPr>
+            <p:cNvPr id="22" name="Arc 21">
+              <a:extLst>
+                <a:ext uri="{FF2B5EF4-FFF2-40B4-BE49-F238E27FC236}">
+                  <a16:creationId xmlns:a16="http://schemas.microsoft.com/office/drawing/2014/main" id="{6E1A0635-1C83-4870-936B-DB4CAA2E31AF}"/>
+                </a:ext>
+              </a:extLst>
+            </p:cNvPr>
+            <p:cNvSpPr/>
+            <p:nvPr/>
+          </p:nvSpPr>
+          <p:spPr>
+            <a:xfrm>
+              <a:off x="4746961" y="2247286"/>
+              <a:ext cx="852484" cy="2991575"/>
+            </a:xfrm>
+            <a:prstGeom prst="arc">
+              <a:avLst>
+                <a:gd name="adj1" fmla="val 16139058"/>
+                <a:gd name="adj2" fmla="val 143163"/>
+              </a:avLst>
+            </a:prstGeom>
+            <a:ln w="38100">
+              <a:solidFill>
+                <a:srgbClr val="FFFF00"/>
+              </a:solidFill>
+              <a:prstDash val="sysDash"/>
+              <a:miter lim="800000"/>
+              <a:extLst>
+                <a:ext uri="{C807C97D-BFC1-408E-A445-0C87EB9F89A2}">
+                  <ask:lineSketchStyleProps xmlns:ask="http://schemas.microsoft.com/office/drawing/2018/sketchyshapes" sd="1219033472">
+                    <a:custGeom>
+                      <a:avLst/>
+                      <a:gdLst>
+                        <a:gd name="connsiteX0" fmla="*/ 395454 w 795337"/>
+                        <a:gd name="connsiteY0" fmla="*/ 6 h 739220"/>
+                        <a:gd name="connsiteX1" fmla="*/ 673541 w 795337"/>
+                        <a:gd name="connsiteY1" fmla="*/ 103402 h 739220"/>
+                        <a:gd name="connsiteX2" fmla="*/ 794938 w 795337"/>
+                        <a:gd name="connsiteY2" fmla="*/ 386164 h 739220"/>
+                        <a:gd name="connsiteX3" fmla="*/ 397669 w 795337"/>
+                        <a:gd name="connsiteY3" fmla="*/ 369610 h 739220"/>
+                        <a:gd name="connsiteX4" fmla="*/ 395454 w 795337"/>
+                        <a:gd name="connsiteY4" fmla="*/ 6 h 739220"/>
+                        <a:gd name="connsiteX0" fmla="*/ 395454 w 795337"/>
+                        <a:gd name="connsiteY0" fmla="*/ 6 h 739220"/>
+                        <a:gd name="connsiteX1" fmla="*/ 673541 w 795337"/>
+                        <a:gd name="connsiteY1" fmla="*/ 103402 h 739220"/>
+                        <a:gd name="connsiteX2" fmla="*/ 794938 w 795337"/>
+                        <a:gd name="connsiteY2" fmla="*/ 386164 h 739220"/>
+                      </a:gdLst>
+                      <a:ahLst/>
+                      <a:cxnLst>
+                        <a:cxn ang="0">
+                          <a:pos x="connsiteX0" y="connsiteY0"/>
+                        </a:cxn>
+                        <a:cxn ang="0">
+                          <a:pos x="connsiteX1" y="connsiteY1"/>
+                        </a:cxn>
+                        <a:cxn ang="0">
+                          <a:pos x="connsiteX2" y="connsiteY2"/>
+                        </a:cxn>
+                      </a:cxnLst>
+                      <a:rect l="l" t="t" r="r" b="b"/>
+                      <a:pathLst>
+                        <a:path w="795337" h="739220" stroke="0" extrusionOk="0">
+                          <a:moveTo>
+                            <a:pt x="395454" y="6"/>
+                          </a:moveTo>
+                          <a:cubicBezTo>
+                            <a:pt x="489062" y="-6725"/>
+                            <a:pt x="590577" y="39688"/>
+                            <a:pt x="673541" y="103402"/>
+                          </a:cubicBezTo>
+                          <a:cubicBezTo>
+                            <a:pt x="764753" y="178949"/>
+                            <a:pt x="793056" y="280301"/>
+                            <a:pt x="794938" y="386164"/>
+                          </a:cubicBezTo>
+                          <a:cubicBezTo>
+                            <a:pt x="713392" y="380894"/>
+                            <a:pt x="484140" y="358154"/>
+                            <a:pt x="397669" y="369610"/>
+                          </a:cubicBezTo>
+                          <a:cubicBezTo>
+                            <a:pt x="388440" y="241763"/>
+                            <a:pt x="405215" y="127518"/>
+                            <a:pt x="395454" y="6"/>
+                          </a:cubicBezTo>
+                          <a:close/>
+                        </a:path>
+                        <a:path w="795337" h="739220" fill="none" extrusionOk="0">
+                          <a:moveTo>
+                            <a:pt x="395454" y="6"/>
+                          </a:moveTo>
+                          <a:cubicBezTo>
+                            <a:pt x="514170" y="1257"/>
+                            <a:pt x="602836" y="28439"/>
+                            <a:pt x="673541" y="103402"/>
+                          </a:cubicBezTo>
+                          <a:cubicBezTo>
+                            <a:pt x="738194" y="174370"/>
+                            <a:pt x="790767" y="288823"/>
+                            <a:pt x="794938" y="386164"/>
+                          </a:cubicBezTo>
+                        </a:path>
+                      </a:pathLst>
+                    </a:custGeom>
+                    <ask:type>
+                      <ask:lineSketchNone/>
+                    </ask:type>
+                  </ask:lineSketchStyleProps>
+                </a:ext>
+              </a:extLst>
+            </a:ln>
+          </p:spPr>
+          <p:style>
+            <a:lnRef idx="1">
+              <a:schemeClr val="accent4"/>
+            </a:lnRef>
+            <a:fillRef idx="0">
+              <a:schemeClr val="accent4"/>
+            </a:fillRef>
+            <a:effectRef idx="0">
+              <a:schemeClr val="accent4"/>
+            </a:effectRef>
+            <a:fontRef idx="minor">
+              <a:schemeClr val="tx1"/>
+            </a:fontRef>
+          </p:style>
+          <p:txBody>
+            <a:bodyPr rtlCol="0" anchor="ctr"/>
+            <a:lstStyle/>
+            <a:p>
+              <a:pPr algn="ctr"/>
+              <a:endParaRPr lang="en-US" dirty="0"/>
+            </a:p>
+          </p:txBody>
+        </p:sp>
+      </p:grpSp>
+      <p:grpSp>
+        <p:nvGrpSpPr>
+          <p:cNvPr id="45" name="Group 44">
+            <a:extLst>
+              <a:ext uri="{FF2B5EF4-FFF2-40B4-BE49-F238E27FC236}">
+                <a16:creationId xmlns:a16="http://schemas.microsoft.com/office/drawing/2014/main" id="{18A17FDA-CE6A-4A22-8CE0-7E1EE8727541}"/>
+              </a:ext>
+            </a:extLst>
+          </p:cNvPr>
+          <p:cNvGrpSpPr/>
+          <p:nvPr/>
+        </p:nvGrpSpPr>
+        <p:grpSpPr>
+          <a:xfrm>
+            <a:off x="4708173" y="4342809"/>
+            <a:ext cx="930621" cy="1381294"/>
+            <a:chOff x="4708173" y="4342809"/>
+            <a:chExt cx="914404" cy="1381294"/>
+          </a:xfrm>
+        </p:grpSpPr>
+        <p:cxnSp>
+          <p:nvCxnSpPr>
+            <p:cNvPr id="13" name="Straight Connector 12">
+              <a:extLst>
+                <a:ext uri="{FF2B5EF4-FFF2-40B4-BE49-F238E27FC236}">
+                  <a16:creationId xmlns:a16="http://schemas.microsoft.com/office/drawing/2014/main" id="{506B2F6C-41C5-4D3D-A7F4-DE46C9A46DFE}"/>
+                </a:ext>
+              </a:extLst>
+            </p:cNvPr>
+            <p:cNvCxnSpPr>
+              <a:cxnSpLocks/>
+            </p:cNvCxnSpPr>
+            <p:nvPr/>
+          </p:nvCxnSpPr>
+          <p:spPr>
+            <a:xfrm>
+              <a:off x="4724400" y="4342809"/>
+              <a:ext cx="0" cy="913220"/>
+            </a:xfrm>
+            <a:prstGeom prst="line">
+              <a:avLst/>
+            </a:prstGeom>
+            <a:ln w="38100">
+              <a:solidFill>
+                <a:srgbClr val="FFFF00"/>
+              </a:solidFill>
+              <a:prstDash val="sysDash"/>
+            </a:ln>
+          </p:spPr>
+          <p:style>
+            <a:lnRef idx="1">
+              <a:schemeClr val="accent1"/>
+            </a:lnRef>
+            <a:fillRef idx="0">
+              <a:schemeClr val="accent1"/>
+            </a:fillRef>
+            <a:effectRef idx="0">
+              <a:schemeClr val="accent1"/>
+            </a:effectRef>
+            <a:fontRef idx="minor">
+              <a:schemeClr val="tx1"/>
+            </a:fontRef>
+          </p:style>
+        </p:cxnSp>
+        <p:cxnSp>
+          <p:nvCxnSpPr>
+            <p:cNvPr id="14" name="Straight Connector 13">
+              <a:extLst>
+                <a:ext uri="{FF2B5EF4-FFF2-40B4-BE49-F238E27FC236}">
+                  <a16:creationId xmlns:a16="http://schemas.microsoft.com/office/drawing/2014/main" id="{13442374-A271-4398-B33D-98A3846F7503}"/>
+                </a:ext>
+              </a:extLst>
+            </p:cNvPr>
+            <p:cNvCxnSpPr>
+              <a:cxnSpLocks/>
+            </p:cNvCxnSpPr>
+            <p:nvPr/>
+          </p:nvCxnSpPr>
+          <p:spPr>
+            <a:xfrm>
+              <a:off x="5622577" y="4393091"/>
+              <a:ext cx="0" cy="913220"/>
+            </a:xfrm>
+            <a:prstGeom prst="line">
+              <a:avLst/>
+            </a:prstGeom>
+            <a:ln w="38100">
+              <a:solidFill>
+                <a:srgbClr val="FFFF00"/>
+              </a:solidFill>
+              <a:prstDash val="sysDash"/>
+            </a:ln>
+          </p:spPr>
+          <p:style>
+            <a:lnRef idx="1">
+              <a:schemeClr val="accent1"/>
+            </a:lnRef>
+            <a:fillRef idx="0">
+              <a:schemeClr val="accent1"/>
+            </a:fillRef>
+            <a:effectRef idx="0">
+              <a:schemeClr val="accent1"/>
+            </a:effectRef>
+            <a:fontRef idx="minor">
+              <a:schemeClr val="tx1"/>
+            </a:fontRef>
+          </p:style>
+        </p:cxnSp>
+        <p:sp>
+          <p:nvSpPr>
+            <p:cNvPr id="23" name="Arc 22">
+              <a:extLst>
+                <a:ext uri="{FF2B5EF4-FFF2-40B4-BE49-F238E27FC236}">
+                  <a16:creationId xmlns:a16="http://schemas.microsoft.com/office/drawing/2014/main" id="{B3C0949C-DC49-4546-A6AC-9F734309BBE1}"/>
+                </a:ext>
+              </a:extLst>
+            </p:cNvPr>
+            <p:cNvSpPr/>
+            <p:nvPr/>
+          </p:nvSpPr>
+          <p:spPr>
+            <a:xfrm rot="5400000">
+              <a:off x="4734282" y="4835813"/>
+              <a:ext cx="862181" cy="914400"/>
+            </a:xfrm>
+            <a:prstGeom prst="arc">
+              <a:avLst>
+                <a:gd name="adj1" fmla="val 16550694"/>
+                <a:gd name="adj2" fmla="val 143163"/>
+              </a:avLst>
+            </a:prstGeom>
+            <a:ln w="38100">
+              <a:solidFill>
+                <a:srgbClr val="FFFF00"/>
+              </a:solidFill>
+              <a:prstDash val="sysDash"/>
+              <a:miter lim="800000"/>
+              <a:extLst>
+                <a:ext uri="{C807C97D-BFC1-408E-A445-0C87EB9F89A2}">
+                  <ask:lineSketchStyleProps xmlns:ask="http://schemas.microsoft.com/office/drawing/2018/sketchyshapes" sd="1219033472">
+                    <a:custGeom>
+                      <a:avLst/>
+                      <a:gdLst>
+                        <a:gd name="connsiteX0" fmla="*/ 395454 w 795337"/>
+                        <a:gd name="connsiteY0" fmla="*/ 6 h 739220"/>
+                        <a:gd name="connsiteX1" fmla="*/ 673541 w 795337"/>
+                        <a:gd name="connsiteY1" fmla="*/ 103402 h 739220"/>
+                        <a:gd name="connsiteX2" fmla="*/ 794938 w 795337"/>
+                        <a:gd name="connsiteY2" fmla="*/ 386164 h 739220"/>
+                        <a:gd name="connsiteX3" fmla="*/ 397669 w 795337"/>
+                        <a:gd name="connsiteY3" fmla="*/ 369610 h 739220"/>
+                        <a:gd name="connsiteX4" fmla="*/ 395454 w 795337"/>
+                        <a:gd name="connsiteY4" fmla="*/ 6 h 739220"/>
+                        <a:gd name="connsiteX0" fmla="*/ 395454 w 795337"/>
+                        <a:gd name="connsiteY0" fmla="*/ 6 h 739220"/>
+                        <a:gd name="connsiteX1" fmla="*/ 673541 w 795337"/>
+                        <a:gd name="connsiteY1" fmla="*/ 103402 h 739220"/>
+                        <a:gd name="connsiteX2" fmla="*/ 794938 w 795337"/>
+                        <a:gd name="connsiteY2" fmla="*/ 386164 h 739220"/>
+                      </a:gdLst>
+                      <a:ahLst/>
+                      <a:cxnLst>
+                        <a:cxn ang="0">
+                          <a:pos x="connsiteX0" y="connsiteY0"/>
+                        </a:cxn>
+                        <a:cxn ang="0">
+                          <a:pos x="connsiteX1" y="connsiteY1"/>
+                        </a:cxn>
+                        <a:cxn ang="0">
+                          <a:pos x="connsiteX2" y="connsiteY2"/>
+                        </a:cxn>
+                      </a:cxnLst>
+                      <a:rect l="l" t="t" r="r" b="b"/>
+                      <a:pathLst>
+                        <a:path w="795337" h="739220" stroke="0" extrusionOk="0">
+                          <a:moveTo>
+                            <a:pt x="395454" y="6"/>
+                          </a:moveTo>
+                          <a:cubicBezTo>
+                            <a:pt x="489062" y="-6725"/>
+                            <a:pt x="590577" y="39688"/>
+                            <a:pt x="673541" y="103402"/>
+                          </a:cubicBezTo>
+                          <a:cubicBezTo>
+                            <a:pt x="764753" y="178949"/>
+                            <a:pt x="793056" y="280301"/>
+                            <a:pt x="794938" y="386164"/>
+                          </a:cubicBezTo>
+                          <a:cubicBezTo>
+                            <a:pt x="713392" y="380894"/>
+                            <a:pt x="484140" y="358154"/>
+                            <a:pt x="397669" y="369610"/>
+                          </a:cubicBezTo>
+                          <a:cubicBezTo>
+                            <a:pt x="388440" y="241763"/>
+                            <a:pt x="405215" y="127518"/>
+                            <a:pt x="395454" y="6"/>
+                          </a:cubicBezTo>
+                          <a:close/>
+                        </a:path>
+                        <a:path w="795337" h="739220" fill="none" extrusionOk="0">
+                          <a:moveTo>
+                            <a:pt x="395454" y="6"/>
+                          </a:moveTo>
+                          <a:cubicBezTo>
+                            <a:pt x="514170" y="1257"/>
+                            <a:pt x="602836" y="28439"/>
+                            <a:pt x="673541" y="103402"/>
+                          </a:cubicBezTo>
+                          <a:cubicBezTo>
+                            <a:pt x="738194" y="174370"/>
+                            <a:pt x="790767" y="288823"/>
+                            <a:pt x="794938" y="386164"/>
+                          </a:cubicBezTo>
+                        </a:path>
+                      </a:pathLst>
+                    </a:custGeom>
+                    <ask:type>
+                      <ask:lineSketchNone/>
+                    </ask:type>
+                  </ask:lineSketchStyleProps>
+                </a:ext>
+              </a:extLst>
+            </a:ln>
+          </p:spPr>
+          <p:style>
+            <a:lnRef idx="1">
+              <a:schemeClr val="accent4"/>
+            </a:lnRef>
+            <a:fillRef idx="0">
+              <a:schemeClr val="accent4"/>
+            </a:fillRef>
+            <a:effectRef idx="0">
+              <a:schemeClr val="accent4"/>
+            </a:effectRef>
+            <a:fontRef idx="minor">
+              <a:schemeClr val="tx1"/>
+            </a:fontRef>
+          </p:style>
+          <p:txBody>
+            <a:bodyPr rtlCol="0" anchor="ctr"/>
+            <a:lstStyle/>
+            <a:p>
+              <a:pPr algn="ctr"/>
+              <a:endParaRPr lang="en-US"/>
+            </a:p>
+          </p:txBody>
+        </p:sp>
+        <p:sp>
+          <p:nvSpPr>
+            <p:cNvPr id="24" name="Arc 23">
+              <a:extLst>
+                <a:ext uri="{FF2B5EF4-FFF2-40B4-BE49-F238E27FC236}">
+                  <a16:creationId xmlns:a16="http://schemas.microsoft.com/office/drawing/2014/main" id="{9CBD9EF6-CCA8-4B14-8BDC-F878F467BB80}"/>
+                </a:ext>
+              </a:extLst>
+            </p:cNvPr>
+            <p:cNvSpPr/>
+            <p:nvPr/>
+          </p:nvSpPr>
+          <p:spPr>
+            <a:xfrm rot="10800000">
+              <a:off x="4724400" y="4810883"/>
+              <a:ext cx="850688" cy="913220"/>
+            </a:xfrm>
+            <a:prstGeom prst="arc">
+              <a:avLst>
+                <a:gd name="adj1" fmla="val 15973730"/>
+                <a:gd name="adj2" fmla="val 427168"/>
+              </a:avLst>
+            </a:prstGeom>
+            <a:ln w="38100">
+              <a:solidFill>
+                <a:srgbClr val="FFFF00"/>
+              </a:solidFill>
+              <a:prstDash val="sysDash"/>
+              <a:miter lim="800000"/>
+              <a:extLst>
+                <a:ext uri="{C807C97D-BFC1-408E-A445-0C87EB9F89A2}">
+                  <ask:lineSketchStyleProps xmlns:ask="http://schemas.microsoft.com/office/drawing/2018/sketchyshapes" sd="1219033472">
+                    <a:custGeom>
+                      <a:avLst/>
+                      <a:gdLst>
+                        <a:gd name="connsiteX0" fmla="*/ 395454 w 795337"/>
+                        <a:gd name="connsiteY0" fmla="*/ 6 h 739220"/>
+                        <a:gd name="connsiteX1" fmla="*/ 673541 w 795337"/>
+                        <a:gd name="connsiteY1" fmla="*/ 103402 h 739220"/>
+                        <a:gd name="connsiteX2" fmla="*/ 794938 w 795337"/>
+                        <a:gd name="connsiteY2" fmla="*/ 386164 h 739220"/>
+                        <a:gd name="connsiteX3" fmla="*/ 397669 w 795337"/>
+                        <a:gd name="connsiteY3" fmla="*/ 369610 h 739220"/>
+                        <a:gd name="connsiteX4" fmla="*/ 395454 w 795337"/>
+                        <a:gd name="connsiteY4" fmla="*/ 6 h 739220"/>
+                        <a:gd name="connsiteX0" fmla="*/ 395454 w 795337"/>
+                        <a:gd name="connsiteY0" fmla="*/ 6 h 739220"/>
+                        <a:gd name="connsiteX1" fmla="*/ 673541 w 795337"/>
+                        <a:gd name="connsiteY1" fmla="*/ 103402 h 739220"/>
+                        <a:gd name="connsiteX2" fmla="*/ 794938 w 795337"/>
+                        <a:gd name="connsiteY2" fmla="*/ 386164 h 739220"/>
+                      </a:gdLst>
+                      <a:ahLst/>
+                      <a:cxnLst>
+                        <a:cxn ang="0">
+                          <a:pos x="connsiteX0" y="connsiteY0"/>
+                        </a:cxn>
+                        <a:cxn ang="0">
+                          <a:pos x="connsiteX1" y="connsiteY1"/>
+                        </a:cxn>
+                        <a:cxn ang="0">
+                          <a:pos x="connsiteX2" y="connsiteY2"/>
+                        </a:cxn>
+                      </a:cxnLst>
+                      <a:rect l="l" t="t" r="r" b="b"/>
+                      <a:pathLst>
+                        <a:path w="795337" h="739220" stroke="0" extrusionOk="0">
+                          <a:moveTo>
+                            <a:pt x="395454" y="6"/>
+                          </a:moveTo>
+                          <a:cubicBezTo>
+                            <a:pt x="489062" y="-6725"/>
+                            <a:pt x="590577" y="39688"/>
+                            <a:pt x="673541" y="103402"/>
+                          </a:cubicBezTo>
+                          <a:cubicBezTo>
+                            <a:pt x="764753" y="178949"/>
+                            <a:pt x="793056" y="280301"/>
+                            <a:pt x="794938" y="386164"/>
+                          </a:cubicBezTo>
+                          <a:cubicBezTo>
+                            <a:pt x="713392" y="380894"/>
+                            <a:pt x="484140" y="358154"/>
+                            <a:pt x="397669" y="369610"/>
+                          </a:cubicBezTo>
+                          <a:cubicBezTo>
+                            <a:pt x="388440" y="241763"/>
+                            <a:pt x="405215" y="127518"/>
+                            <a:pt x="395454" y="6"/>
+                          </a:cubicBezTo>
+                          <a:close/>
+                        </a:path>
+                        <a:path w="795337" h="739220" fill="none" extrusionOk="0">
+                          <a:moveTo>
+                            <a:pt x="395454" y="6"/>
+                          </a:moveTo>
+                          <a:cubicBezTo>
+                            <a:pt x="514170" y="1257"/>
+                            <a:pt x="602836" y="28439"/>
+                            <a:pt x="673541" y="103402"/>
+                          </a:cubicBezTo>
+                          <a:cubicBezTo>
+                            <a:pt x="738194" y="174370"/>
+                            <a:pt x="790767" y="288823"/>
+                            <a:pt x="794938" y="386164"/>
+                          </a:cubicBezTo>
+                        </a:path>
+                      </a:pathLst>
+                    </a:custGeom>
+                    <ask:type>
+                      <ask:lineSketchNone/>
+                    </ask:type>
+                  </ask:lineSketchStyleProps>
+                </a:ext>
+              </a:extLst>
+            </a:ln>
+          </p:spPr>
+          <p:style>
+            <a:lnRef idx="1">
+              <a:schemeClr val="accent4"/>
+            </a:lnRef>
+            <a:fillRef idx="0">
+              <a:schemeClr val="accent4"/>
+            </a:fillRef>
+            <a:effectRef idx="0">
+              <a:schemeClr val="accent4"/>
+            </a:effectRef>
+            <a:fontRef idx="minor">
+              <a:schemeClr val="tx1"/>
+            </a:fontRef>
+          </p:style>
+          <p:txBody>
+            <a:bodyPr rtlCol="0" anchor="ctr"/>
+            <a:lstStyle/>
+            <a:p>
+              <a:pPr algn="ctr"/>
+              <a:endParaRPr lang="en-US"/>
+            </a:p>
+          </p:txBody>
+        </p:sp>
+      </p:grpSp>
+      <p:grpSp>
+        <p:nvGrpSpPr>
+          <p:cNvPr id="25" name="Group 24">
+            <a:extLst>
+              <a:ext uri="{FF2B5EF4-FFF2-40B4-BE49-F238E27FC236}">
+                <a16:creationId xmlns:a16="http://schemas.microsoft.com/office/drawing/2014/main" id="{BA1415A4-A966-4A6F-8258-EA73E135B1AD}"/>
+              </a:ext>
+            </a:extLst>
+          </p:cNvPr>
+          <p:cNvGrpSpPr/>
+          <p:nvPr/>
+        </p:nvGrpSpPr>
+        <p:grpSpPr>
+          <a:xfrm>
+            <a:off x="5133386" y="4271091"/>
+            <a:ext cx="114299" cy="114300"/>
+            <a:chOff x="4198877" y="3486150"/>
+            <a:chExt cx="106420" cy="100034"/>
+          </a:xfrm>
+        </p:grpSpPr>
+        <p:sp>
+          <p:nvSpPr>
+            <p:cNvPr id="26" name="Rectangle 25">
+              <a:extLst>
+                <a:ext uri="{FF2B5EF4-FFF2-40B4-BE49-F238E27FC236}">
+                  <a16:creationId xmlns:a16="http://schemas.microsoft.com/office/drawing/2014/main" id="{D933842C-0106-4C09-B455-2B8292E0E7C8}"/>
+                </a:ext>
+              </a:extLst>
+            </p:cNvPr>
+            <p:cNvSpPr/>
+            <p:nvPr/>
+          </p:nvSpPr>
+          <p:spPr>
+            <a:xfrm>
+              <a:off x="4198877" y="3486150"/>
+              <a:ext cx="106420" cy="100034"/>
+            </a:xfrm>
+            <a:prstGeom prst="rect">
+              <a:avLst/>
+            </a:prstGeom>
+            <a:solidFill>
+              <a:srgbClr val="FF0000"/>
+            </a:solidFill>
+            <a:ln>
+              <a:noFill/>
+            </a:ln>
+          </p:spPr>
+          <p:style>
+            <a:lnRef idx="2">
+              <a:schemeClr val="accent1">
+                <a:shade val="50000"/>
+              </a:schemeClr>
+            </a:lnRef>
+            <a:fillRef idx="1">
+              <a:schemeClr val="accent1"/>
+            </a:fillRef>
+            <a:effectRef idx="0">
+              <a:schemeClr val="accent1"/>
+            </a:effectRef>
+            <a:fontRef idx="minor">
+              <a:schemeClr val="lt1"/>
+            </a:fontRef>
+          </p:style>
+          <p:txBody>
+            <a:bodyPr rtlCol="0" anchor="ctr"/>
+            <a:lstStyle/>
+            <a:p>
+              <a:pPr algn="ctr"/>
+              <a:endParaRPr lang="en-US"/>
+            </a:p>
+          </p:txBody>
+        </p:sp>
+        <p:sp>
+          <p:nvSpPr>
+            <p:cNvPr id="27" name="Rectangle 26">
+              <a:extLst>
+                <a:ext uri="{FF2B5EF4-FFF2-40B4-BE49-F238E27FC236}">
+                  <a16:creationId xmlns:a16="http://schemas.microsoft.com/office/drawing/2014/main" id="{4028701B-7B43-4748-9D84-22D582A15F03}"/>
+                </a:ext>
+              </a:extLst>
+            </p:cNvPr>
+            <p:cNvSpPr/>
+            <p:nvPr/>
+          </p:nvSpPr>
+          <p:spPr>
+            <a:xfrm>
+              <a:off x="4252087" y="3536167"/>
+              <a:ext cx="53210" cy="50017"/>
+            </a:xfrm>
+            <a:prstGeom prst="rect">
+              <a:avLst/>
+            </a:prstGeom>
+            <a:ln>
+              <a:noFill/>
+            </a:ln>
+          </p:spPr>
+          <p:style>
+            <a:lnRef idx="2">
+              <a:schemeClr val="accent1">
+                <a:shade val="50000"/>
+              </a:schemeClr>
+            </a:lnRef>
+            <a:fillRef idx="1">
+              <a:schemeClr val="accent1"/>
+            </a:fillRef>
+            <a:effectRef idx="0">
+              <a:schemeClr val="accent1"/>
+            </a:effectRef>
+            <a:fontRef idx="minor">
+              <a:schemeClr val="lt1"/>
+            </a:fontRef>
+          </p:style>
+          <p:txBody>
+            <a:bodyPr rtlCol="0" anchor="ctr"/>
+            <a:lstStyle/>
+            <a:p>
+              <a:pPr algn="ctr"/>
+              <a:endParaRPr lang="en-US"/>
+            </a:p>
+          </p:txBody>
+        </p:sp>
+      </p:grpSp>
+      <p:grpSp>
+        <p:nvGrpSpPr>
+          <p:cNvPr id="28" name="Group 27">
+            <a:extLst>
+              <a:ext uri="{FF2B5EF4-FFF2-40B4-BE49-F238E27FC236}">
+                <a16:creationId xmlns:a16="http://schemas.microsoft.com/office/drawing/2014/main" id="{977928FC-10EB-4374-9F87-8C0C299EE0EF}"/>
+              </a:ext>
+            </a:extLst>
+          </p:cNvPr>
+          <p:cNvGrpSpPr/>
+          <p:nvPr/>
+        </p:nvGrpSpPr>
+        <p:grpSpPr>
+          <a:xfrm>
+            <a:off x="4277998" y="3532194"/>
+            <a:ext cx="114299" cy="114300"/>
+            <a:chOff x="4198877" y="3486150"/>
+            <a:chExt cx="106420" cy="100034"/>
+          </a:xfrm>
+        </p:grpSpPr>
+        <p:sp>
+          <p:nvSpPr>
+            <p:cNvPr id="29" name="Rectangle 28">
+              <a:extLst>
+                <a:ext uri="{FF2B5EF4-FFF2-40B4-BE49-F238E27FC236}">
+                  <a16:creationId xmlns:a16="http://schemas.microsoft.com/office/drawing/2014/main" id="{5369637D-5821-4E65-8698-27A72EBACCFF}"/>
+                </a:ext>
+              </a:extLst>
+            </p:cNvPr>
+            <p:cNvSpPr/>
+            <p:nvPr/>
+          </p:nvSpPr>
+          <p:spPr>
+            <a:xfrm>
+              <a:off x="4198877" y="3486150"/>
+              <a:ext cx="106420" cy="100034"/>
+            </a:xfrm>
+            <a:prstGeom prst="rect">
+              <a:avLst/>
+            </a:prstGeom>
+            <a:solidFill>
+              <a:srgbClr val="FF0000"/>
+            </a:solidFill>
+            <a:ln>
+              <a:noFill/>
+            </a:ln>
+          </p:spPr>
+          <p:style>
+            <a:lnRef idx="2">
+              <a:schemeClr val="accent1">
+                <a:shade val="50000"/>
+              </a:schemeClr>
+            </a:lnRef>
+            <a:fillRef idx="1">
+              <a:schemeClr val="accent1"/>
+            </a:fillRef>
+            <a:effectRef idx="0">
+              <a:schemeClr val="accent1"/>
+            </a:effectRef>
+            <a:fontRef idx="minor">
+              <a:schemeClr val="lt1"/>
+            </a:fontRef>
+          </p:style>
+          <p:txBody>
+            <a:bodyPr rtlCol="0" anchor="ctr"/>
+            <a:lstStyle/>
+            <a:p>
+              <a:pPr algn="ctr"/>
+              <a:endParaRPr lang="en-US"/>
+            </a:p>
+          </p:txBody>
+        </p:sp>
+        <p:sp>
+          <p:nvSpPr>
+            <p:cNvPr id="30" name="Rectangle 29">
+              <a:extLst>
+                <a:ext uri="{FF2B5EF4-FFF2-40B4-BE49-F238E27FC236}">
+                  <a16:creationId xmlns:a16="http://schemas.microsoft.com/office/drawing/2014/main" id="{E1B17CF8-94FC-4072-A90B-F3BDF24CD948}"/>
+                </a:ext>
+              </a:extLst>
+            </p:cNvPr>
+            <p:cNvSpPr/>
+            <p:nvPr/>
+          </p:nvSpPr>
+          <p:spPr>
+            <a:xfrm>
+              <a:off x="4252087" y="3536167"/>
+              <a:ext cx="53210" cy="50017"/>
+            </a:xfrm>
+            <a:prstGeom prst="rect">
+              <a:avLst/>
+            </a:prstGeom>
+            <a:ln>
+              <a:noFill/>
+            </a:ln>
+          </p:spPr>
+          <p:style>
+            <a:lnRef idx="2">
+              <a:schemeClr val="accent1">
+                <a:shade val="50000"/>
+              </a:schemeClr>
+            </a:lnRef>
+            <a:fillRef idx="1">
+              <a:schemeClr val="accent1"/>
+            </a:fillRef>
+            <a:effectRef idx="0">
+              <a:schemeClr val="accent1"/>
+            </a:effectRef>
+            <a:fontRef idx="minor">
+              <a:schemeClr val="lt1"/>
+            </a:fontRef>
+          </p:style>
+          <p:txBody>
+            <a:bodyPr rtlCol="0" anchor="ctr"/>
+            <a:lstStyle/>
+            <a:p>
+              <a:pPr algn="ctr"/>
+              <a:endParaRPr lang="en-US"/>
+            </a:p>
+          </p:txBody>
+        </p:sp>
+      </p:grpSp>
+      <p:grpSp>
+        <p:nvGrpSpPr>
+          <p:cNvPr id="31" name="Group 30">
+            <a:extLst>
+              <a:ext uri="{FF2B5EF4-FFF2-40B4-BE49-F238E27FC236}">
+                <a16:creationId xmlns:a16="http://schemas.microsoft.com/office/drawing/2014/main" id="{755C1E55-2D5E-4977-A800-5040553A45EB}"/>
+              </a:ext>
+            </a:extLst>
+          </p:cNvPr>
+          <p:cNvGrpSpPr/>
+          <p:nvPr/>
+        </p:nvGrpSpPr>
+        <p:grpSpPr>
+          <a:xfrm rot="16200000">
+            <a:off x="4271633" y="6011855"/>
+            <a:ext cx="114299" cy="114300"/>
+            <a:chOff x="4198877" y="3486150"/>
+            <a:chExt cx="106420" cy="100034"/>
+          </a:xfrm>
+        </p:grpSpPr>
+        <p:sp>
+          <p:nvSpPr>
+            <p:cNvPr id="32" name="Rectangle 31">
+              <a:extLst>
+                <a:ext uri="{FF2B5EF4-FFF2-40B4-BE49-F238E27FC236}">
+                  <a16:creationId xmlns:a16="http://schemas.microsoft.com/office/drawing/2014/main" id="{EBA9C2F8-7DEA-4214-882D-47280C0499F4}"/>
+                </a:ext>
+              </a:extLst>
+            </p:cNvPr>
+            <p:cNvSpPr/>
+            <p:nvPr/>
+          </p:nvSpPr>
+          <p:spPr>
+            <a:xfrm>
+              <a:off x="4198877" y="3486150"/>
+              <a:ext cx="106420" cy="100034"/>
+            </a:xfrm>
+            <a:prstGeom prst="rect">
+              <a:avLst/>
+            </a:prstGeom>
+            <a:solidFill>
+              <a:srgbClr val="FF0000"/>
+            </a:solidFill>
+            <a:ln>
+              <a:noFill/>
+            </a:ln>
+          </p:spPr>
+          <p:style>
+            <a:lnRef idx="2">
+              <a:schemeClr val="accent1">
+                <a:shade val="50000"/>
+              </a:schemeClr>
+            </a:lnRef>
+            <a:fillRef idx="1">
+              <a:schemeClr val="accent1"/>
+            </a:fillRef>
+            <a:effectRef idx="0">
+              <a:schemeClr val="accent1"/>
+            </a:effectRef>
+            <a:fontRef idx="minor">
+              <a:schemeClr val="lt1"/>
+            </a:fontRef>
+          </p:style>
+          <p:txBody>
+            <a:bodyPr rtlCol="0" anchor="ctr"/>
+            <a:lstStyle/>
+            <a:p>
+              <a:pPr algn="ctr"/>
+              <a:endParaRPr lang="en-US"/>
+            </a:p>
+          </p:txBody>
+        </p:sp>
+        <p:sp>
+          <p:nvSpPr>
+            <p:cNvPr id="33" name="Rectangle 32">
+              <a:extLst>
+                <a:ext uri="{FF2B5EF4-FFF2-40B4-BE49-F238E27FC236}">
+                  <a16:creationId xmlns:a16="http://schemas.microsoft.com/office/drawing/2014/main" id="{41BD4AAF-A076-4DD1-910F-68934A9FF095}"/>
+                </a:ext>
+              </a:extLst>
+            </p:cNvPr>
+            <p:cNvSpPr/>
+            <p:nvPr/>
+          </p:nvSpPr>
+          <p:spPr>
+            <a:xfrm>
+              <a:off x="4252087" y="3536167"/>
+              <a:ext cx="53210" cy="50017"/>
+            </a:xfrm>
+            <a:prstGeom prst="rect">
+              <a:avLst/>
+            </a:prstGeom>
+            <a:ln>
+              <a:noFill/>
+            </a:ln>
+          </p:spPr>
+          <p:style>
+            <a:lnRef idx="2">
+              <a:schemeClr val="accent1">
+                <a:shade val="50000"/>
+              </a:schemeClr>
+            </a:lnRef>
+            <a:fillRef idx="1">
+              <a:schemeClr val="accent1"/>
+            </a:fillRef>
+            <a:effectRef idx="0">
+              <a:schemeClr val="accent1"/>
+            </a:effectRef>
+            <a:fontRef idx="minor">
+              <a:schemeClr val="lt1"/>
+            </a:fontRef>
+          </p:style>
+          <p:txBody>
+            <a:bodyPr rtlCol="0" anchor="ctr"/>
+            <a:lstStyle/>
+            <a:p>
+              <a:pPr algn="ctr"/>
+              <a:endParaRPr lang="en-US"/>
+            </a:p>
+          </p:txBody>
+        </p:sp>
+      </p:grpSp>
+      <p:grpSp>
+        <p:nvGrpSpPr>
+          <p:cNvPr id="34" name="Group 33">
+            <a:extLst>
+              <a:ext uri="{FF2B5EF4-FFF2-40B4-BE49-F238E27FC236}">
+                <a16:creationId xmlns:a16="http://schemas.microsoft.com/office/drawing/2014/main" id="{BADC0F2B-AACA-4C73-ACA4-E83EFFA0E75F}"/>
+              </a:ext>
+            </a:extLst>
+          </p:cNvPr>
+          <p:cNvGrpSpPr/>
+          <p:nvPr/>
+        </p:nvGrpSpPr>
+        <p:grpSpPr>
+          <a:xfrm rot="10800000">
+            <a:off x="5123924" y="5226303"/>
+            <a:ext cx="114299" cy="114300"/>
+            <a:chOff x="4198877" y="3486150"/>
+            <a:chExt cx="106420" cy="100034"/>
+          </a:xfrm>
+        </p:grpSpPr>
+        <p:sp>
+          <p:nvSpPr>
+            <p:cNvPr id="35" name="Rectangle 34">
+              <a:extLst>
+                <a:ext uri="{FF2B5EF4-FFF2-40B4-BE49-F238E27FC236}">
+                  <a16:creationId xmlns:a16="http://schemas.microsoft.com/office/drawing/2014/main" id="{409CFAC9-A9C7-4072-B9E1-BA2C97E35BB9}"/>
+                </a:ext>
+              </a:extLst>
+            </p:cNvPr>
+            <p:cNvSpPr/>
+            <p:nvPr/>
+          </p:nvSpPr>
+          <p:spPr>
+            <a:xfrm>
+              <a:off x="4198877" y="3486150"/>
+              <a:ext cx="106420" cy="100034"/>
+            </a:xfrm>
+            <a:prstGeom prst="rect">
+              <a:avLst/>
+            </a:prstGeom>
+            <a:solidFill>
+              <a:srgbClr val="FF0000"/>
+            </a:solidFill>
+            <a:ln>
+              <a:noFill/>
+            </a:ln>
+          </p:spPr>
+          <p:style>
+            <a:lnRef idx="2">
+              <a:schemeClr val="accent1">
+                <a:shade val="50000"/>
+              </a:schemeClr>
+            </a:lnRef>
+            <a:fillRef idx="1">
+              <a:schemeClr val="accent1"/>
+            </a:fillRef>
+            <a:effectRef idx="0">
+              <a:schemeClr val="accent1"/>
+            </a:effectRef>
+            <a:fontRef idx="minor">
+              <a:schemeClr val="lt1"/>
+            </a:fontRef>
+          </p:style>
+          <p:txBody>
+            <a:bodyPr rtlCol="0" anchor="ctr"/>
+            <a:lstStyle/>
+            <a:p>
+              <a:pPr algn="ctr"/>
+              <a:endParaRPr lang="en-US"/>
+            </a:p>
+          </p:txBody>
+        </p:sp>
+        <p:sp>
+          <p:nvSpPr>
+            <p:cNvPr id="36" name="Rectangle 35">
+              <a:extLst>
+                <a:ext uri="{FF2B5EF4-FFF2-40B4-BE49-F238E27FC236}">
+                  <a16:creationId xmlns:a16="http://schemas.microsoft.com/office/drawing/2014/main" id="{6D3CCE0A-19EA-4EFF-8C43-5448F5E7EDBF}"/>
+                </a:ext>
+              </a:extLst>
+            </p:cNvPr>
+            <p:cNvSpPr/>
+            <p:nvPr/>
+          </p:nvSpPr>
+          <p:spPr>
+            <a:xfrm>
+              <a:off x="4252087" y="3536167"/>
+              <a:ext cx="53210" cy="50017"/>
+            </a:xfrm>
+            <a:prstGeom prst="rect">
+              <a:avLst/>
+            </a:prstGeom>
+            <a:ln>
+              <a:noFill/>
+            </a:ln>
+          </p:spPr>
+          <p:style>
+            <a:lnRef idx="2">
+              <a:schemeClr val="accent1">
+                <a:shade val="50000"/>
+              </a:schemeClr>
+            </a:lnRef>
+            <a:fillRef idx="1">
+              <a:schemeClr val="accent1"/>
+            </a:fillRef>
+            <a:effectRef idx="0">
+              <a:schemeClr val="accent1"/>
+            </a:effectRef>
+            <a:fontRef idx="minor">
+              <a:schemeClr val="lt1"/>
+            </a:fontRef>
+          </p:style>
+          <p:txBody>
+            <a:bodyPr rtlCol="0" anchor="ctr"/>
+            <a:lstStyle/>
+            <a:p>
+              <a:pPr algn="ctr"/>
+              <a:endParaRPr lang="en-US"/>
+            </a:p>
+          </p:txBody>
+        </p:sp>
+      </p:grpSp>
+      <p:grpSp>
+        <p:nvGrpSpPr>
+          <p:cNvPr id="37" name="Group 36">
+            <a:extLst>
+              <a:ext uri="{FF2B5EF4-FFF2-40B4-BE49-F238E27FC236}">
+                <a16:creationId xmlns:a16="http://schemas.microsoft.com/office/drawing/2014/main" id="{96522A51-13D3-4F57-90A3-D4C3C0309456}"/>
+              </a:ext>
+            </a:extLst>
+          </p:cNvPr>
+          <p:cNvGrpSpPr/>
+          <p:nvPr/>
+        </p:nvGrpSpPr>
+        <p:grpSpPr>
+          <a:xfrm rot="10800000">
+            <a:off x="5987483" y="6011854"/>
+            <a:ext cx="114299" cy="114300"/>
+            <a:chOff x="4198877" y="3486150"/>
+            <a:chExt cx="106420" cy="100034"/>
+          </a:xfrm>
+        </p:grpSpPr>
+        <p:sp>
+          <p:nvSpPr>
+            <p:cNvPr id="38" name="Rectangle 37">
+              <a:extLst>
+                <a:ext uri="{FF2B5EF4-FFF2-40B4-BE49-F238E27FC236}">
+                  <a16:creationId xmlns:a16="http://schemas.microsoft.com/office/drawing/2014/main" id="{0E874FEA-F839-47C3-8007-BE2D9B65B9C8}"/>
+                </a:ext>
+              </a:extLst>
+            </p:cNvPr>
+            <p:cNvSpPr/>
+            <p:nvPr/>
+          </p:nvSpPr>
+          <p:spPr>
+            <a:xfrm>
+              <a:off x="4198877" y="3486150"/>
+              <a:ext cx="106420" cy="100034"/>
+            </a:xfrm>
+            <a:prstGeom prst="rect">
+              <a:avLst/>
+            </a:prstGeom>
+            <a:solidFill>
+              <a:srgbClr val="FF0000"/>
+            </a:solidFill>
+            <a:ln>
+              <a:noFill/>
+            </a:ln>
+          </p:spPr>
+          <p:style>
+            <a:lnRef idx="2">
+              <a:schemeClr val="accent1">
+                <a:shade val="50000"/>
+              </a:schemeClr>
+            </a:lnRef>
+            <a:fillRef idx="1">
+              <a:schemeClr val="accent1"/>
+            </a:fillRef>
+            <a:effectRef idx="0">
+              <a:schemeClr val="accent1"/>
+            </a:effectRef>
+            <a:fontRef idx="minor">
+              <a:schemeClr val="lt1"/>
+            </a:fontRef>
+          </p:style>
+          <p:txBody>
+            <a:bodyPr rtlCol="0" anchor="ctr"/>
+            <a:lstStyle/>
+            <a:p>
+              <a:pPr algn="ctr"/>
+              <a:endParaRPr lang="en-US"/>
+            </a:p>
+          </p:txBody>
+        </p:sp>
+        <p:sp>
+          <p:nvSpPr>
+            <p:cNvPr id="39" name="Rectangle 38">
+              <a:extLst>
+                <a:ext uri="{FF2B5EF4-FFF2-40B4-BE49-F238E27FC236}">
+                  <a16:creationId xmlns:a16="http://schemas.microsoft.com/office/drawing/2014/main" id="{5E4A1D57-A790-420A-A9D4-CC719D24B825}"/>
+                </a:ext>
+              </a:extLst>
+            </p:cNvPr>
+            <p:cNvSpPr/>
+            <p:nvPr/>
+          </p:nvSpPr>
+          <p:spPr>
+            <a:xfrm>
+              <a:off x="4252087" y="3536167"/>
+              <a:ext cx="53210" cy="50017"/>
+            </a:xfrm>
+            <a:prstGeom prst="rect">
+              <a:avLst/>
+            </a:prstGeom>
+            <a:ln>
+              <a:noFill/>
+            </a:ln>
+          </p:spPr>
+          <p:style>
+            <a:lnRef idx="2">
+              <a:schemeClr val="accent1">
+                <a:shade val="50000"/>
+              </a:schemeClr>
+            </a:lnRef>
+            <a:fillRef idx="1">
+              <a:schemeClr val="accent1"/>
+            </a:fillRef>
+            <a:effectRef idx="0">
+              <a:schemeClr val="accent1"/>
+            </a:effectRef>
+            <a:fontRef idx="minor">
+              <a:schemeClr val="lt1"/>
+            </a:fontRef>
+          </p:style>
+          <p:txBody>
+            <a:bodyPr rtlCol="0" anchor="ctr"/>
+            <a:lstStyle/>
+            <a:p>
+              <a:pPr algn="ctr"/>
+              <a:endParaRPr lang="en-US"/>
+            </a:p>
+          </p:txBody>
+        </p:sp>
+      </p:grpSp>
+      <p:grpSp>
+        <p:nvGrpSpPr>
+          <p:cNvPr id="40" name="Group 39">
+            <a:extLst>
+              <a:ext uri="{FF2B5EF4-FFF2-40B4-BE49-F238E27FC236}">
+                <a16:creationId xmlns:a16="http://schemas.microsoft.com/office/drawing/2014/main" id="{591EC394-E2EF-438F-AD26-3603D40B9F89}"/>
+              </a:ext>
+            </a:extLst>
+          </p:cNvPr>
+          <p:cNvGrpSpPr/>
+          <p:nvPr/>
+        </p:nvGrpSpPr>
+        <p:grpSpPr>
+          <a:xfrm rot="5400000">
+            <a:off x="5989765" y="3542120"/>
+            <a:ext cx="114299" cy="114300"/>
+            <a:chOff x="4198877" y="3486150"/>
+            <a:chExt cx="106420" cy="100034"/>
+          </a:xfrm>
+        </p:grpSpPr>
+        <p:sp>
+          <p:nvSpPr>
+            <p:cNvPr id="41" name="Rectangle 40">
+              <a:extLst>
+                <a:ext uri="{FF2B5EF4-FFF2-40B4-BE49-F238E27FC236}">
+                  <a16:creationId xmlns:a16="http://schemas.microsoft.com/office/drawing/2014/main" id="{4AEAE5EC-D638-4DD7-A986-6D2D3C41A979}"/>
+                </a:ext>
+              </a:extLst>
+            </p:cNvPr>
+            <p:cNvSpPr/>
+            <p:nvPr/>
+          </p:nvSpPr>
+          <p:spPr>
+            <a:xfrm>
+              <a:off x="4198877" y="3486150"/>
+              <a:ext cx="106420" cy="100034"/>
+            </a:xfrm>
+            <a:prstGeom prst="rect">
+              <a:avLst/>
+            </a:prstGeom>
+            <a:solidFill>
+              <a:srgbClr val="FF0000"/>
+            </a:solidFill>
+            <a:ln>
+              <a:noFill/>
+            </a:ln>
+          </p:spPr>
+          <p:style>
+            <a:lnRef idx="2">
+              <a:schemeClr val="accent1">
+                <a:shade val="50000"/>
+              </a:schemeClr>
+            </a:lnRef>
+            <a:fillRef idx="1">
+              <a:schemeClr val="accent1"/>
+            </a:fillRef>
+            <a:effectRef idx="0">
+              <a:schemeClr val="accent1"/>
+            </a:effectRef>
+            <a:fontRef idx="minor">
+              <a:schemeClr val="lt1"/>
+            </a:fontRef>
+          </p:style>
+          <p:txBody>
+            <a:bodyPr rtlCol="0" anchor="ctr"/>
+            <a:lstStyle/>
+            <a:p>
+              <a:pPr algn="ctr"/>
+              <a:endParaRPr lang="en-US"/>
+            </a:p>
+          </p:txBody>
+        </p:sp>
+        <p:sp>
+          <p:nvSpPr>
+            <p:cNvPr id="42" name="Rectangle 41">
+              <a:extLst>
+                <a:ext uri="{FF2B5EF4-FFF2-40B4-BE49-F238E27FC236}">
+                  <a16:creationId xmlns:a16="http://schemas.microsoft.com/office/drawing/2014/main" id="{FAAE7DD7-9DE6-42E2-8E71-337CFA723D1D}"/>
+                </a:ext>
+              </a:extLst>
+            </p:cNvPr>
+            <p:cNvSpPr/>
+            <p:nvPr/>
+          </p:nvSpPr>
+          <p:spPr>
+            <a:xfrm>
+              <a:off x="4252087" y="3536167"/>
+              <a:ext cx="53210" cy="50017"/>
+            </a:xfrm>
+            <a:prstGeom prst="rect">
+              <a:avLst/>
+            </a:prstGeom>
+            <a:ln>
+              <a:noFill/>
+            </a:ln>
+          </p:spPr>
+          <p:style>
+            <a:lnRef idx="2">
+              <a:schemeClr val="accent1">
+                <a:shade val="50000"/>
+              </a:schemeClr>
+            </a:lnRef>
+            <a:fillRef idx="1">
+              <a:schemeClr val="accent1"/>
+            </a:fillRef>
+            <a:effectRef idx="0">
+              <a:schemeClr val="accent1"/>
+            </a:effectRef>
+            <a:fontRef idx="minor">
+              <a:schemeClr val="lt1"/>
+            </a:fontRef>
+          </p:style>
+          <p:txBody>
+            <a:bodyPr rtlCol="0" anchor="ctr"/>
+            <a:lstStyle/>
+            <a:p>
+              <a:pPr algn="ctr"/>
+              <a:endParaRPr lang="en-US"/>
+            </a:p>
+          </p:txBody>
+        </p:sp>
+      </p:grpSp>
+    </p:spTree>
+    <p:extLst>
+      <p:ext uri="{BB962C8B-B14F-4D97-AF65-F5344CB8AC3E}">
+        <p14:creationId xmlns:p14="http://schemas.microsoft.com/office/powerpoint/2010/main" val="2488806964"/>
+      </p:ext>
+    </p:extLst>
+  </p:cSld>
+  <p:clrMapOvr>
+    <a:masterClrMapping/>
+  </p:clrMapOvr>
+</p:sld>
+</file>
+
 <file path=ppt/theme/theme1.xml><?xml version="1.0" encoding="utf-8"?>
 <a:theme xmlns:a="http://schemas.openxmlformats.org/drawingml/2006/main" name="Office Theme">
   <a:themeElements>

</xml_diff>